<commit_message>
Added my personal portfolio
NOT FINISHED
</commit_message>
<xml_diff>
--- a/documentation/Personal Portfolios/Richard/Artefact 5.pptx
+++ b/documentation/Personal Portfolios/Richard/Artefact 5.pptx
@@ -229,6 +229,11 @@
       </a:defRPr>
     </a:lvl9pPr>
   </p:defaultTextStyle>
+  <p:extLst>
+    <p:ext uri="{EFAFB233-063F-42B5-8137-9DF3F51BA10A}">
+      <p15:sldGuideLst xmlns:p15="http://schemas.microsoft.com/office/powerpoint/2012/main"/>
+    </p:ext>
+  </p:extLst>
 </p:presentation>
 </file>
 
@@ -6647,6 +6652,135 @@
             <a:r>
               <a:rPr lang="en"/>
               <a:t>Testing</a:t>
+            </a:r>
+          </a:p>
+        </p:txBody>
+      </p:sp>
+      <p:sp>
+        <p:nvSpPr>
+          <p:cNvPr id="2" name="Rectangle 1"/>
+          <p:cNvSpPr/>
+          <p:nvPr/>
+        </p:nvSpPr>
+        <p:spPr>
+          <a:xfrm>
+            <a:off x="4856400" y="1152475"/>
+            <a:ext cx="3975900" cy="2451953"/>
+          </a:xfrm>
+          <a:prstGeom prst="rect">
+            <a:avLst/>
+          </a:prstGeom>
+        </p:spPr>
+        <p:txBody>
+          <a:bodyPr wrap="square">
+            <a:spAutoFit/>
+          </a:bodyPr>
+          <a:lstStyle/>
+          <a:p>
+            <a:pPr>
+              <a:spcAft>
+                <a:spcPts val="1600"/>
+              </a:spcAft>
+            </a:pPr>
+            <a:r>
+              <a:rPr lang="en-US" dirty="0">
+                <a:solidFill>
+                  <a:srgbClr val="ADADAD"/>
+                </a:solidFill>
+                <a:latin typeface="Arial" charset="0"/>
+              </a:rPr>
+              <a:t>Acceptance Criteria:</a:t>
+            </a:r>
+            <a:endParaRPr lang="en-US" dirty="0"/>
+          </a:p>
+          <a:p>
+            <a:pPr fontAlgn="base">
+              <a:buFont typeface="Arial" charset="0"/>
+              <a:buChar char="•"/>
+            </a:pPr>
+            <a:r>
+              <a:rPr lang="en-US" dirty="0">
+                <a:solidFill>
+                  <a:srgbClr val="ADADAD"/>
+                </a:solidFill>
+                <a:latin typeface="Arial" charset="0"/>
+              </a:rPr>
+              <a:t>Various filters (newest request, student asking, type)</a:t>
+            </a:r>
+          </a:p>
+          <a:p>
+            <a:pPr fontAlgn="base">
+              <a:buFont typeface="Arial" charset="0"/>
+              <a:buChar char="•"/>
+            </a:pPr>
+            <a:r>
+              <a:rPr lang="en-US" dirty="0">
+                <a:solidFill>
+                  <a:srgbClr val="ADADAD"/>
+                </a:solidFill>
+                <a:latin typeface="Arial" charset="0"/>
+              </a:rPr>
+              <a:t>Ability to accept or deny requests</a:t>
+            </a:r>
+          </a:p>
+          <a:p>
+            <a:pPr fontAlgn="base">
+              <a:buFont typeface="Arial" charset="0"/>
+              <a:buChar char="•"/>
+            </a:pPr>
+            <a:r>
+              <a:rPr lang="en-US" dirty="0">
+                <a:solidFill>
+                  <a:srgbClr val="ADADAD"/>
+                </a:solidFill>
+                <a:latin typeface="Arial" charset="0"/>
+              </a:rPr>
+              <a:t>If denied, must give reason</a:t>
+            </a:r>
+          </a:p>
+          <a:p>
+            <a:pPr fontAlgn="base">
+              <a:buFont typeface="Arial" charset="0"/>
+              <a:buChar char="•"/>
+            </a:pPr>
+            <a:r>
+              <a:rPr lang="en-US" dirty="0">
+                <a:solidFill>
+                  <a:srgbClr val="ADADAD"/>
+                </a:solidFill>
+                <a:latin typeface="Arial" charset="0"/>
+              </a:rPr>
+              <a:t>Ability to specify an instrument to give the student or assign randomly.</a:t>
+            </a:r>
+          </a:p>
+          <a:p>
+            <a:pPr fontAlgn="base">
+              <a:buFont typeface="Arial" charset="0"/>
+              <a:buChar char="•"/>
+            </a:pPr>
+            <a:r>
+              <a:rPr lang="en-US" dirty="0">
+                <a:solidFill>
+                  <a:srgbClr val="ADADAD"/>
+                </a:solidFill>
+                <a:latin typeface="Arial" charset="0"/>
+              </a:rPr>
+              <a:t>Student is informed</a:t>
+            </a:r>
+          </a:p>
+          <a:p>
+            <a:pPr fontAlgn="base">
+              <a:buFont typeface="Arial" charset="0"/>
+              <a:buChar char="•"/>
+            </a:pPr>
+            <a:r>
+              <a:rPr lang="en-US" dirty="0">
+                <a:solidFill>
+                  <a:srgbClr val="ADADAD"/>
+                </a:solidFill>
+                <a:latin typeface="Arial" charset="0"/>
+              </a:rPr>
+              <a:t>Once instrument is assigned to a student, it must be marked as hired</a:t>
             </a:r>
           </a:p>
         </p:txBody>
@@ -8415,146 +8549,6 @@
           </a:p>
         </p:txBody>
       </p:sp>
-      <p:sp>
-        <p:nvSpPr>
-          <p:cNvPr id="98" name="Shape 98"/>
-          <p:cNvSpPr txBox="1"/>
-          <p:nvPr/>
-        </p:nvSpPr>
-        <p:spPr>
-          <a:xfrm>
-            <a:off x="5226150" y="1152475"/>
-            <a:ext cx="3554100" cy="3416400"/>
-          </a:xfrm>
-          <a:prstGeom prst="rect">
-            <a:avLst/>
-          </a:prstGeom>
-          <a:noFill/>
-          <a:ln>
-            <a:noFill/>
-          </a:ln>
-        </p:spPr>
-        <p:txBody>
-          <a:bodyPr lIns="91425" tIns="91425" rIns="91425" bIns="91425" anchor="t" anchorCtr="0">
-            <a:noAutofit/>
-          </a:bodyPr>
-          <a:lstStyle/>
-          <a:p>
-            <a:pPr marR="0" lvl="0" algn="l" rtl="0">
-              <a:lnSpc>
-                <a:spcPct val="115000"/>
-              </a:lnSpc>
-              <a:spcBef>
-                <a:spcPts val="0"/>
-              </a:spcBef>
-              <a:spcAft>
-                <a:spcPts val="1600"/>
-              </a:spcAft>
-              <a:buNone/>
-            </a:pPr>
-            <a:r>
-              <a:rPr lang="en" sz="1800" dirty="0">
-                <a:solidFill>
-                  <a:schemeClr val="lt2"/>
-                </a:solidFill>
-              </a:rPr>
-              <a:t>Acceptance Criteria:</a:t>
-            </a:r>
-          </a:p>
-          <a:p>
-            <a:pPr marL="457200" marR="0" lvl="0" indent="-342900" algn="l" rtl="0">
-              <a:lnSpc>
-                <a:spcPct val="115000"/>
-              </a:lnSpc>
-              <a:spcBef>
-                <a:spcPts val="0"/>
-              </a:spcBef>
-              <a:spcAft>
-                <a:spcPts val="1600"/>
-              </a:spcAft>
-              <a:buClr>
-                <a:schemeClr val="lt2"/>
-              </a:buClr>
-              <a:buSzPct val="100000"/>
-              <a:buChar char="●"/>
-            </a:pPr>
-            <a:r>
-              <a:rPr lang="en" sz="1800" dirty="0">
-                <a:solidFill>
-                  <a:schemeClr val="lt2"/>
-                </a:solidFill>
-              </a:rPr>
-              <a:t>Create account</a:t>
-            </a:r>
-          </a:p>
-          <a:p>
-            <a:pPr marL="457200" marR="0" lvl="0" indent="-342900" algn="l" rtl="0">
-              <a:lnSpc>
-                <a:spcPct val="115000"/>
-              </a:lnSpc>
-              <a:spcBef>
-                <a:spcPts val="0"/>
-              </a:spcBef>
-              <a:spcAft>
-                <a:spcPts val="1600"/>
-              </a:spcAft>
-              <a:buClr>
-                <a:schemeClr val="lt2"/>
-              </a:buClr>
-              <a:buSzPct val="100000"/>
-              <a:buChar char="●"/>
-            </a:pPr>
-            <a:r>
-              <a:rPr lang="en" sz="1800" dirty="0">
-                <a:solidFill>
-                  <a:schemeClr val="lt2"/>
-                </a:solidFill>
-              </a:rPr>
-              <a:t>Enter personal details (name, dob, address)</a:t>
-            </a:r>
-          </a:p>
-          <a:p>
-            <a:pPr marL="457200" lvl="0" indent="-342900">
-              <a:spcBef>
-                <a:spcPts val="0"/>
-              </a:spcBef>
-              <a:buClr>
-                <a:schemeClr val="lt2"/>
-              </a:buClr>
-              <a:buSzPct val="100000"/>
-              <a:buChar char="●"/>
-            </a:pPr>
-            <a:r>
-              <a:rPr lang="en" sz="1800" dirty="0">
-                <a:solidFill>
-                  <a:schemeClr val="lt2"/>
-                </a:solidFill>
-              </a:rPr>
-              <a:t>Able to successfully register</a:t>
-            </a:r>
-          </a:p>
-          <a:p>
-            <a:pPr marL="457200" lvl="0" indent="-342900" rtl="0">
-              <a:spcBef>
-                <a:spcPts val="0"/>
-              </a:spcBef>
-              <a:buClr>
-                <a:schemeClr val="lt2"/>
-              </a:buClr>
-              <a:buSzPct val="100000"/>
-              <a:buChar char="●"/>
-            </a:pPr>
-            <a:r>
-              <a:rPr lang="en" sz="1800" dirty="0">
-                <a:solidFill>
-                  <a:schemeClr val="lt2"/>
-                </a:solidFill>
-              </a:rPr>
-              <a:t>Email validation</a:t>
-            </a:r>
-          </a:p>
-        </p:txBody>
-      </p:sp>
     </p:spTree>
   </p:cSld>
   <p:clrMapOvr>
@@ -8748,164 +8742,6 @@
             <a:r>
               <a:rPr lang="en"/>
               <a:t>Merge Template with Application</a:t>
-            </a:r>
-          </a:p>
-        </p:txBody>
-      </p:sp>
-      <p:sp>
-        <p:nvSpPr>
-          <p:cNvPr id="105" name="Shape 105"/>
-          <p:cNvSpPr txBox="1"/>
-          <p:nvPr/>
-        </p:nvSpPr>
-        <p:spPr>
-          <a:xfrm>
-            <a:off x="5226150" y="1152475"/>
-            <a:ext cx="3554100" cy="3416400"/>
-          </a:xfrm>
-          <a:prstGeom prst="rect">
-            <a:avLst/>
-          </a:prstGeom>
-          <a:noFill/>
-          <a:ln>
-            <a:noFill/>
-          </a:ln>
-        </p:spPr>
-        <p:txBody>
-          <a:bodyPr lIns="91425" tIns="91425" rIns="91425" bIns="91425" anchor="t" anchorCtr="0">
-            <a:noAutofit/>
-          </a:bodyPr>
-          <a:lstStyle/>
-          <a:p>
-            <a:pPr marR="0" lvl="0" algn="l" rtl="0">
-              <a:lnSpc>
-                <a:spcPct val="115000"/>
-              </a:lnSpc>
-              <a:spcBef>
-                <a:spcPts val="0"/>
-              </a:spcBef>
-              <a:spcAft>
-                <a:spcPts val="1600"/>
-              </a:spcAft>
-              <a:buNone/>
-            </a:pPr>
-            <a:r>
-              <a:rPr lang="en" sz="1800" dirty="0">
-                <a:solidFill>
-                  <a:schemeClr val="lt2"/>
-                </a:solidFill>
-              </a:rPr>
-              <a:t>Acceptance Criteria:</a:t>
-            </a:r>
-          </a:p>
-          <a:p>
-            <a:pPr marL="457200" lvl="0" indent="-228600" rtl="0">
-              <a:spcBef>
-                <a:spcPts val="0"/>
-              </a:spcBef>
-              <a:buClr>
-                <a:schemeClr val="lt2"/>
-              </a:buClr>
-              <a:buChar char="●"/>
-            </a:pPr>
-            <a:r>
-              <a:rPr lang="en" dirty="0">
-                <a:solidFill>
-                  <a:schemeClr val="lt2"/>
-                </a:solidFill>
-              </a:rPr>
-              <a:t>Able to enter general details - Name, email, phone, address</a:t>
-            </a:r>
-          </a:p>
-          <a:p>
-            <a:pPr marL="457200" lvl="0" indent="-228600" rtl="0">
-              <a:spcBef>
-                <a:spcPts val="0"/>
-              </a:spcBef>
-              <a:buClr>
-                <a:schemeClr val="lt2"/>
-              </a:buClr>
-              <a:buChar char="●"/>
-            </a:pPr>
-            <a:r>
-              <a:rPr lang="en" dirty="0">
-                <a:solidFill>
-                  <a:schemeClr val="lt2"/>
-                </a:solidFill>
-              </a:rPr>
-              <a:t>Able to create account if details are given</a:t>
-            </a:r>
-            <a:br>
-              <a:rPr lang="en" dirty="0">
-                <a:solidFill>
-                  <a:schemeClr val="lt2"/>
-                </a:solidFill>
-              </a:rPr>
-            </a:br>
-            <a:r>
-              <a:rPr lang="en" dirty="0">
-                <a:solidFill>
-                  <a:schemeClr val="lt2"/>
-                </a:solidFill>
-              </a:rPr>
-              <a:t>produces error if not</a:t>
-            </a:r>
-          </a:p>
-          <a:p>
-            <a:pPr marL="457200" lvl="0" indent="-228600" rtl="0">
-              <a:spcBef>
-                <a:spcPts val="0"/>
-              </a:spcBef>
-              <a:buClr>
-                <a:schemeClr val="lt2"/>
-              </a:buClr>
-              <a:buChar char="●"/>
-            </a:pPr>
-            <a:r>
-              <a:rPr lang="en" dirty="0">
-                <a:solidFill>
-                  <a:schemeClr val="lt2"/>
-                </a:solidFill>
-              </a:rPr>
-              <a:t>Email account details to teacher with temp password that needs to be changed on first login</a:t>
-            </a:r>
-          </a:p>
-          <a:p>
-            <a:pPr marL="457200" lvl="0" indent="-228600" rtl="0">
-              <a:spcBef>
-                <a:spcPts val="0"/>
-              </a:spcBef>
-              <a:buClr>
-                <a:schemeClr val="lt2"/>
-              </a:buClr>
-              <a:buChar char="●"/>
-            </a:pPr>
-            <a:r>
-              <a:rPr lang="en" dirty="0">
-                <a:solidFill>
-                  <a:schemeClr val="lt2"/>
-                </a:solidFill>
-              </a:rPr>
-              <a:t>Teacher account can log in after creation</a:t>
-            </a:r>
-          </a:p>
-          <a:p>
-            <a:pPr marL="457200" lvl="0" indent="-228600" rtl="0">
-              <a:spcBef>
-                <a:spcPts val="0"/>
-              </a:spcBef>
-              <a:buClr>
-                <a:schemeClr val="lt2"/>
-              </a:buClr>
-              <a:buChar char="●"/>
-            </a:pPr>
-            <a:r>
-              <a:rPr lang="en" dirty="0">
-                <a:solidFill>
-                  <a:schemeClr val="lt2"/>
-                </a:solidFill>
-              </a:rPr>
-              <a:t>Teacher prompted to change password on login</a:t>
             </a:r>
           </a:p>
         </p:txBody>

</xml_diff>